<commit_message>
Update 8 & 124
</commit_message>
<xml_diff>
--- a/124葡萄樹與枝子.pptx
+++ b/124葡萄樹與枝子.pptx
@@ -110,6 +110,11 @@
       </a:defRPr>
     </a:lvl9pPr>
   </p:defaultTextStyle>
+  <p:extLst>
+    <p:ext uri="{EFAFB233-063F-42B5-8137-9DF3F51BA10A}">
+      <p15:sldGuideLst xmlns:p15="http://schemas.microsoft.com/office/powerpoint/2012/main"/>
+    </p:ext>
+  </p:extLst>
 </p:presentation>
 </file>
 
@@ -294,7 +299,7 @@
           <a:p>
             <a:fld id="{7CB4B6F8-510D-4470-856B-0109BED3A038}" type="datetimeFigureOut">
               <a:rPr lang="vi-VN" smtClean="0"/>
-              <a:t>22/08/2020</a:t>
+              <a:t>01/10/2022</a:t>
             </a:fld>
             <a:endParaRPr lang="vi-VN"/>
           </a:p>
@@ -464,7 +469,7 @@
           <a:p>
             <a:fld id="{7CB4B6F8-510D-4470-856B-0109BED3A038}" type="datetimeFigureOut">
               <a:rPr lang="vi-VN" smtClean="0"/>
-              <a:t>22/08/2020</a:t>
+              <a:t>01/10/2022</a:t>
             </a:fld>
             <a:endParaRPr lang="vi-VN"/>
           </a:p>
@@ -644,7 +649,7 @@
           <a:p>
             <a:fld id="{7CB4B6F8-510D-4470-856B-0109BED3A038}" type="datetimeFigureOut">
               <a:rPr lang="vi-VN" smtClean="0"/>
-              <a:t>22/08/2020</a:t>
+              <a:t>01/10/2022</a:t>
             </a:fld>
             <a:endParaRPr lang="vi-VN"/>
           </a:p>
@@ -814,7 +819,7 @@
           <a:p>
             <a:fld id="{7CB4B6F8-510D-4470-856B-0109BED3A038}" type="datetimeFigureOut">
               <a:rPr lang="vi-VN" smtClean="0"/>
-              <a:t>22/08/2020</a:t>
+              <a:t>01/10/2022</a:t>
             </a:fld>
             <a:endParaRPr lang="vi-VN"/>
           </a:p>
@@ -1060,7 +1065,7 @@
           <a:p>
             <a:fld id="{7CB4B6F8-510D-4470-856B-0109BED3A038}" type="datetimeFigureOut">
               <a:rPr lang="vi-VN" smtClean="0"/>
-              <a:t>22/08/2020</a:t>
+              <a:t>01/10/2022</a:t>
             </a:fld>
             <a:endParaRPr lang="vi-VN"/>
           </a:p>
@@ -1348,7 +1353,7 @@
           <a:p>
             <a:fld id="{7CB4B6F8-510D-4470-856B-0109BED3A038}" type="datetimeFigureOut">
               <a:rPr lang="vi-VN" smtClean="0"/>
-              <a:t>22/08/2020</a:t>
+              <a:t>01/10/2022</a:t>
             </a:fld>
             <a:endParaRPr lang="vi-VN"/>
           </a:p>
@@ -1770,7 +1775,7 @@
           <a:p>
             <a:fld id="{7CB4B6F8-510D-4470-856B-0109BED3A038}" type="datetimeFigureOut">
               <a:rPr lang="vi-VN" smtClean="0"/>
-              <a:t>22/08/2020</a:t>
+              <a:t>01/10/2022</a:t>
             </a:fld>
             <a:endParaRPr lang="vi-VN"/>
           </a:p>
@@ -1888,7 +1893,7 @@
           <a:p>
             <a:fld id="{7CB4B6F8-510D-4470-856B-0109BED3A038}" type="datetimeFigureOut">
               <a:rPr lang="vi-VN" smtClean="0"/>
-              <a:t>22/08/2020</a:t>
+              <a:t>01/10/2022</a:t>
             </a:fld>
             <a:endParaRPr lang="vi-VN"/>
           </a:p>
@@ -1983,7 +1988,7 @@
           <a:p>
             <a:fld id="{7CB4B6F8-510D-4470-856B-0109BED3A038}" type="datetimeFigureOut">
               <a:rPr lang="vi-VN" smtClean="0"/>
-              <a:t>22/08/2020</a:t>
+              <a:t>01/10/2022</a:t>
             </a:fld>
             <a:endParaRPr lang="vi-VN"/>
           </a:p>
@@ -2260,7 +2265,7 @@
           <a:p>
             <a:fld id="{7CB4B6F8-510D-4470-856B-0109BED3A038}" type="datetimeFigureOut">
               <a:rPr lang="vi-VN" smtClean="0"/>
-              <a:t>22/08/2020</a:t>
+              <a:t>01/10/2022</a:t>
             </a:fld>
             <a:endParaRPr lang="vi-VN"/>
           </a:p>
@@ -2517,7 +2522,7 @@
           <a:p>
             <a:fld id="{7CB4B6F8-510D-4470-856B-0109BED3A038}" type="datetimeFigureOut">
               <a:rPr lang="vi-VN" smtClean="0"/>
-              <a:t>22/08/2020</a:t>
+              <a:t>01/10/2022</a:t>
             </a:fld>
             <a:endParaRPr lang="vi-VN"/>
           </a:p>
@@ -2735,7 +2740,7 @@
           <a:p>
             <a:fld id="{7CB4B6F8-510D-4470-856B-0109BED3A038}" type="datetimeFigureOut">
               <a:rPr lang="vi-VN" smtClean="0"/>
-              <a:t>22/08/2020</a:t>
+              <a:t>01/10/2022</a:t>
             </a:fld>
             <a:endParaRPr lang="vi-VN"/>
           </a:p>
@@ -3128,23 +3133,6 @@
           <a:lstStyle/>
           <a:p>
             <a:r>
-              <a:rPr lang="zh-CN" altLang="en-US" sz="9600" b="1" dirty="0">
-                <a:solidFill>
-                  <a:srgbClr val="660033"/>
-                </a:solidFill>
-                <a:effectLst>
-                  <a:outerShdw blurRad="38100" dist="38100" dir="2700000" algn="tl">
-                    <a:srgbClr val="000000">
-                      <a:alpha val="43137"/>
-                    </a:srgbClr>
-                  </a:outerShdw>
-                </a:effectLst>
-                <a:latin typeface="微軟正黑體" pitchFamily="34" charset="-120"/>
-                <a:ea typeface="微軟正黑體" pitchFamily="34" charset="-120"/>
-              </a:rPr>
-              <a:t>葡萄</a:t>
-            </a:r>
-            <a:r>
               <a:rPr lang="zh-CN" altLang="en-US" sz="9600" b="1" dirty="0" smtClean="0">
                 <a:solidFill>
                   <a:srgbClr val="660033"/>
@@ -3159,7 +3147,7 @@
                 <a:latin typeface="微軟正黑體" pitchFamily="34" charset="-120"/>
                 <a:ea typeface="微軟正黑體" pitchFamily="34" charset="-120"/>
               </a:rPr>
-              <a:t>樹與枝子</a:t>
+              <a:t>與主相連</a:t>
             </a:r>
             <a:endParaRPr lang="en-US" sz="9600" b="1" dirty="0">
               <a:solidFill>
@@ -3228,27 +3216,7 @@
                 <a:latin typeface="微軟正黑體" pitchFamily="34" charset="-120"/>
                 <a:ea typeface="微軟正黑體" pitchFamily="34" charset="-120"/>
               </a:rPr>
-              <a:t>15 </a:t>
-            </a:r>
-            <a:r>
-              <a:rPr lang="en-US" altLang="zh-CN" b="1" dirty="0" smtClean="0">
-                <a:solidFill>
-                  <a:srgbClr val="000066"/>
-                </a:solidFill>
-                <a:latin typeface="微軟正黑體" pitchFamily="34" charset="-120"/>
-                <a:ea typeface="微軟正黑體" pitchFamily="34" charset="-120"/>
-              </a:rPr>
-              <a:t>: </a:t>
-            </a:r>
-            <a:r>
-              <a:rPr lang="en-US" altLang="zh-CN" b="1" dirty="0" smtClean="0">
-                <a:solidFill>
-                  <a:srgbClr val="000066"/>
-                </a:solidFill>
-                <a:latin typeface="微軟正黑體" pitchFamily="34" charset="-120"/>
-                <a:ea typeface="微軟正黑體" pitchFamily="34" charset="-120"/>
-              </a:rPr>
-              <a:t>1 – 10</a:t>
+              <a:t>15 : 1 – 10</a:t>
             </a:r>
             <a:endParaRPr lang="en-US" altLang="zh-CN" b="1" dirty="0">
               <a:solidFill>
@@ -3327,17 +3295,7 @@
                 <a:latin typeface="微軟正黑體" pitchFamily="34" charset="-120"/>
                 <a:ea typeface="微軟正黑體" pitchFamily="34" charset="-120"/>
               </a:rPr>
-              <a:t>我</a:t>
-            </a:r>
-            <a:r>
-              <a:rPr lang="zh-TW" altLang="en-US" sz="6400" dirty="0">
-                <a:solidFill>
-                  <a:srgbClr val="000066"/>
-                </a:solidFill>
-                <a:latin typeface="微軟正黑體" pitchFamily="34" charset="-120"/>
-                <a:ea typeface="微軟正黑體" pitchFamily="34" charset="-120"/>
-              </a:rPr>
-              <a:t>是真葡萄樹，我父是栽培的人。 </a:t>
+              <a:t>我是真葡萄樹，我父是栽培的人。 </a:t>
             </a:r>
           </a:p>
           <a:p>
@@ -3349,17 +3307,7 @@
                 <a:latin typeface="微軟正黑體" pitchFamily="34" charset="-120"/>
                 <a:ea typeface="微軟正黑體" pitchFamily="34" charset="-120"/>
               </a:rPr>
-              <a:t>凡</a:t>
-            </a:r>
-            <a:r>
-              <a:rPr lang="zh-TW" altLang="en-US" sz="6400" b="1" dirty="0">
-                <a:solidFill>
-                  <a:srgbClr val="000066"/>
-                </a:solidFill>
-                <a:latin typeface="微軟正黑體" pitchFamily="34" charset="-120"/>
-                <a:ea typeface="微軟正黑體" pitchFamily="34" charset="-120"/>
-              </a:rPr>
-              <a:t>屬我不結果子的枝子，他就剪去；凡結果子的，他就修理乾淨，使枝子結果子更多。 </a:t>
+              <a:t>凡屬我不結果子的枝子，他就剪去；凡結果子的，他就修理乾淨，使枝子結果子更多。 </a:t>
             </a:r>
             <a:endParaRPr lang="en-US" altLang="zh-TW" sz="6400" b="1" dirty="0">
               <a:solidFill>
@@ -3454,17 +3402,7 @@
                 <a:latin typeface="微軟正黑體" pitchFamily="34" charset="-120"/>
                 <a:ea typeface="微軟正黑體" pitchFamily="34" charset="-120"/>
               </a:rPr>
-              <a:t>你</a:t>
-            </a:r>
-            <a:r>
-              <a:rPr lang="zh-TW" altLang="en-US" sz="6400" b="1" dirty="0">
-                <a:solidFill>
-                  <a:srgbClr val="000066"/>
-                </a:solidFill>
-                <a:latin typeface="微軟正黑體" pitchFamily="34" charset="-120"/>
-                <a:ea typeface="微軟正黑體" pitchFamily="34" charset="-120"/>
-              </a:rPr>
-              <a:t>們要常在我裡面，我也常在你們裡面。枝子若不常在葡萄樹上，自己就不能結果子；你們若不常在我裡面，也是這樣。</a:t>
+              <a:t>你們要常在我裡面，我也常在你們裡面。枝子若不常在葡萄樹上，自己就不能結果子；你們若不常在我裡面，也是這樣。</a:t>
             </a:r>
             <a:endParaRPr lang="en-US" altLang="zh-TW" sz="6400" b="1" dirty="0">
               <a:solidFill>

</xml_diff>